<commit_message>
Evolução projeto cast anúncios
</commit_message>
<xml_diff>
--- a/Aula 10/PIC Angular - Aula 10 - Observable.PPTX
+++ b/Aula 10/PIC Angular - Aula 10 - Observable.PPTX
@@ -151,7 +151,7 @@
   </p:defaultTextStyle>
   <p:extLst>
     <p:ext uri="{EFAFB233-063F-42B5-8137-9DF3F51BA10A}">
-      <p15:sldGuideLst xmlns:p15="http://schemas.microsoft.com/office/powerpoint/2012/main">
+      <p15:sldGuideLst xmlns:p15="http://schemas.microsoft.com/office/powerpoint/2012/main" xmlns="">
         <p15:guide id="1" orient="horz" pos="2160">
           <p15:clr>
             <a:srgbClr val="A4A3A4"/>
@@ -251,7 +251,7 @@
             <a:fld id="{4E16BCD9-542D-4D3D-9E0B-2DE32A6AFECE}" type="datetimeFigureOut">
               <a:rPr lang="pt-BR" smtClean="0"/>
               <a:pPr/>
-              <a:t>30/09/2018</a:t>
+              <a:t>01/10/2018</a:t>
             </a:fld>
             <a:endParaRPr lang="pt-BR"/>
           </a:p>
@@ -419,7 +419,7 @@
     </p:spTree>
     <p:extLst>
       <p:ext uri="{BB962C8B-B14F-4D97-AF65-F5344CB8AC3E}">
-        <p14:creationId xmlns:p14="http://schemas.microsoft.com/office/powerpoint/2010/main" val="3984565353"/>
+        <p14:creationId xmlns:p14="http://schemas.microsoft.com/office/powerpoint/2010/main" xmlns="" val="3984565353"/>
       </p:ext>
     </p:extLst>
   </p:cSld>
@@ -594,7 +594,7 @@
     </p:spTree>
     <p:extLst>
       <p:ext uri="{BB962C8B-B14F-4D97-AF65-F5344CB8AC3E}">
-        <p14:creationId xmlns:p14="http://schemas.microsoft.com/office/powerpoint/2010/main" val="2441609050"/>
+        <p14:creationId xmlns:p14="http://schemas.microsoft.com/office/powerpoint/2010/main" xmlns="" val="2441609050"/>
       </p:ext>
     </p:extLst>
   </p:cSld>
@@ -679,7 +679,7 @@
     </p:spTree>
     <p:extLst>
       <p:ext uri="{BB962C8B-B14F-4D97-AF65-F5344CB8AC3E}">
-        <p14:creationId xmlns:p14="http://schemas.microsoft.com/office/powerpoint/2010/main" val="1318969157"/>
+        <p14:creationId xmlns:p14="http://schemas.microsoft.com/office/powerpoint/2010/main" xmlns="" val="1318969157"/>
       </p:ext>
     </p:extLst>
   </p:cSld>
@@ -764,7 +764,7 @@
     </p:spTree>
     <p:extLst>
       <p:ext uri="{BB962C8B-B14F-4D97-AF65-F5344CB8AC3E}">
-        <p14:creationId xmlns:p14="http://schemas.microsoft.com/office/powerpoint/2010/main" val="3854495723"/>
+        <p14:creationId xmlns:p14="http://schemas.microsoft.com/office/powerpoint/2010/main" xmlns="" val="3854495723"/>
       </p:ext>
     </p:extLst>
   </p:cSld>
@@ -849,7 +849,7 @@
     </p:spTree>
     <p:extLst>
       <p:ext uri="{BB962C8B-B14F-4D97-AF65-F5344CB8AC3E}">
-        <p14:creationId xmlns:p14="http://schemas.microsoft.com/office/powerpoint/2010/main" val="2828367925"/>
+        <p14:creationId xmlns:p14="http://schemas.microsoft.com/office/powerpoint/2010/main" xmlns="" val="2828367925"/>
       </p:ext>
     </p:extLst>
   </p:cSld>
@@ -934,7 +934,7 @@
     </p:spTree>
     <p:extLst>
       <p:ext uri="{BB962C8B-B14F-4D97-AF65-F5344CB8AC3E}">
-        <p14:creationId xmlns:p14="http://schemas.microsoft.com/office/powerpoint/2010/main" val="2765288177"/>
+        <p14:creationId xmlns:p14="http://schemas.microsoft.com/office/powerpoint/2010/main" xmlns="" val="2765288177"/>
       </p:ext>
     </p:extLst>
   </p:cSld>
@@ -1019,7 +1019,7 @@
     </p:spTree>
     <p:extLst>
       <p:ext uri="{BB962C8B-B14F-4D97-AF65-F5344CB8AC3E}">
-        <p14:creationId xmlns:p14="http://schemas.microsoft.com/office/powerpoint/2010/main" val="912429746"/>
+        <p14:creationId xmlns:p14="http://schemas.microsoft.com/office/powerpoint/2010/main" xmlns="" val="912429746"/>
       </p:ext>
     </p:extLst>
   </p:cSld>
@@ -1220,7 +1220,7 @@
               <a:pPr>
                 <a:defRPr/>
               </a:pPr>
-              <a:t>9/30/2018</a:t>
+              <a:t>10/1/2018</a:t>
             </a:fld>
             <a:endParaRPr lang="en-US"/>
           </a:p>
@@ -1407,7 +1407,7 @@
               <a:pPr>
                 <a:defRPr/>
               </a:pPr>
-              <a:t>9/30/2018</a:t>
+              <a:t>10/1/2018</a:t>
             </a:fld>
             <a:endParaRPr lang="en-US"/>
           </a:p>
@@ -1604,7 +1604,7 @@
               <a:pPr>
                 <a:defRPr/>
               </a:pPr>
-              <a:t>9/30/2018</a:t>
+              <a:t>10/1/2018</a:t>
             </a:fld>
             <a:endParaRPr lang="en-US"/>
           </a:p>
@@ -1863,7 +1863,7 @@
               <a:pPr>
                 <a:defRPr/>
               </a:pPr>
-              <a:t>9/30/2018</a:t>
+              <a:t>10/1/2018</a:t>
             </a:fld>
             <a:endParaRPr lang="en-US"/>
           </a:p>
@@ -2050,7 +2050,7 @@
               <a:pPr>
                 <a:defRPr/>
               </a:pPr>
-              <a:t>9/30/2018</a:t>
+              <a:t>10/1/2018</a:t>
             </a:fld>
             <a:endParaRPr lang="en-US"/>
           </a:p>
@@ -2313,7 +2313,7 @@
               <a:pPr>
                 <a:defRPr/>
               </a:pPr>
-              <a:t>9/30/2018</a:t>
+              <a:t>10/1/2018</a:t>
             </a:fld>
             <a:endParaRPr lang="en-US"/>
           </a:p>
@@ -2618,7 +2618,7 @@
               <a:pPr>
                 <a:defRPr/>
               </a:pPr>
-              <a:t>9/30/2018</a:t>
+              <a:t>10/1/2018</a:t>
             </a:fld>
             <a:endParaRPr lang="en-US"/>
           </a:p>
@@ -3057,7 +3057,7 @@
               <a:pPr>
                 <a:defRPr/>
               </a:pPr>
-              <a:t>9/30/2018</a:t>
+              <a:t>10/1/2018</a:t>
             </a:fld>
             <a:endParaRPr lang="en-US"/>
           </a:p>
@@ -3192,7 +3192,7 @@
               <a:pPr>
                 <a:defRPr/>
               </a:pPr>
-              <a:t>9/30/2018</a:t>
+              <a:t>10/1/2018</a:t>
             </a:fld>
             <a:endParaRPr lang="en-US"/>
           </a:p>
@@ -3304,7 +3304,7 @@
               <a:pPr>
                 <a:defRPr/>
               </a:pPr>
-              <a:t>9/30/2018</a:t>
+              <a:t>10/1/2018</a:t>
             </a:fld>
             <a:endParaRPr lang="en-US"/>
           </a:p>
@@ -3598,7 +3598,7 @@
               <a:pPr>
                 <a:defRPr/>
               </a:pPr>
-              <a:t>9/30/2018</a:t>
+              <a:t>10/1/2018</a:t>
             </a:fld>
             <a:endParaRPr lang="en-US"/>
           </a:p>
@@ -3785,7 +3785,7 @@
               <a:pPr>
                 <a:defRPr/>
               </a:pPr>
-              <a:t>9/30/2018</a:t>
+              <a:t>10/1/2018</a:t>
             </a:fld>
             <a:endParaRPr lang="en-US"/>
           </a:p>
@@ -4062,7 +4062,7 @@
               <a:pPr>
                 <a:defRPr/>
               </a:pPr>
-              <a:t>9/30/2018</a:t>
+              <a:t>10/1/2018</a:t>
             </a:fld>
             <a:endParaRPr lang="en-US"/>
           </a:p>
@@ -4249,7 +4249,7 @@
               <a:pPr>
                 <a:defRPr/>
               </a:pPr>
-              <a:t>9/30/2018</a:t>
+              <a:t>10/1/2018</a:t>
             </a:fld>
             <a:endParaRPr lang="en-US"/>
           </a:p>
@@ -4446,7 +4446,7 @@
               <a:pPr>
                 <a:defRPr/>
               </a:pPr>
-              <a:t>9/30/2018</a:t>
+              <a:t>10/1/2018</a:t>
             </a:fld>
             <a:endParaRPr lang="en-US"/>
           </a:p>
@@ -4705,7 +4705,7 @@
               <a:pPr>
                 <a:defRPr/>
               </a:pPr>
-              <a:t>9/30/2018</a:t>
+              <a:t>10/1/2018</a:t>
             </a:fld>
             <a:endParaRPr lang="en-US"/>
           </a:p>
@@ -4892,7 +4892,7 @@
               <a:pPr>
                 <a:defRPr/>
               </a:pPr>
-              <a:t>9/30/2018</a:t>
+              <a:t>10/1/2018</a:t>
             </a:fld>
             <a:endParaRPr lang="en-US"/>
           </a:p>
@@ -5155,7 +5155,7 @@
               <a:pPr>
                 <a:defRPr/>
               </a:pPr>
-              <a:t>9/30/2018</a:t>
+              <a:t>10/1/2018</a:t>
             </a:fld>
             <a:endParaRPr lang="en-US"/>
           </a:p>
@@ -5460,7 +5460,7 @@
               <a:pPr>
                 <a:defRPr/>
               </a:pPr>
-              <a:t>9/30/2018</a:t>
+              <a:t>10/1/2018</a:t>
             </a:fld>
             <a:endParaRPr lang="en-US"/>
           </a:p>
@@ -5899,7 +5899,7 @@
               <a:pPr>
                 <a:defRPr/>
               </a:pPr>
-              <a:t>9/30/2018</a:t>
+              <a:t>10/1/2018</a:t>
             </a:fld>
             <a:endParaRPr lang="en-US"/>
           </a:p>
@@ -6034,7 +6034,7 @@
               <a:pPr>
                 <a:defRPr/>
               </a:pPr>
-              <a:t>9/30/2018</a:t>
+              <a:t>10/1/2018</a:t>
             </a:fld>
             <a:endParaRPr lang="en-US"/>
           </a:p>
@@ -6146,7 +6146,7 @@
               <a:pPr>
                 <a:defRPr/>
               </a:pPr>
-              <a:t>9/30/2018</a:t>
+              <a:t>10/1/2018</a:t>
             </a:fld>
             <a:endParaRPr lang="en-US"/>
           </a:p>
@@ -6409,7 +6409,7 @@
               <a:pPr>
                 <a:defRPr/>
               </a:pPr>
-              <a:t>9/30/2018</a:t>
+              <a:t>10/1/2018</a:t>
             </a:fld>
             <a:endParaRPr lang="en-US"/>
           </a:p>
@@ -6703,7 +6703,7 @@
               <a:pPr>
                 <a:defRPr/>
               </a:pPr>
-              <a:t>9/30/2018</a:t>
+              <a:t>10/1/2018</a:t>
             </a:fld>
             <a:endParaRPr lang="en-US"/>
           </a:p>
@@ -6980,7 +6980,7 @@
               <a:pPr>
                 <a:defRPr/>
               </a:pPr>
-              <a:t>9/30/2018</a:t>
+              <a:t>10/1/2018</a:t>
             </a:fld>
             <a:endParaRPr lang="en-US"/>
           </a:p>
@@ -7167,7 +7167,7 @@
               <a:pPr>
                 <a:defRPr/>
               </a:pPr>
-              <a:t>9/30/2018</a:t>
+              <a:t>10/1/2018</a:t>
             </a:fld>
             <a:endParaRPr lang="en-US"/>
           </a:p>
@@ -7364,7 +7364,7 @@
               <a:pPr>
                 <a:defRPr/>
               </a:pPr>
-              <a:t>9/30/2018</a:t>
+              <a:t>10/1/2018</a:t>
             </a:fld>
             <a:endParaRPr lang="en-US"/>
           </a:p>
@@ -7623,7 +7623,7 @@
               <a:pPr>
                 <a:defRPr/>
               </a:pPr>
-              <a:t>9/30/2018</a:t>
+              <a:t>10/1/2018</a:t>
             </a:fld>
             <a:endParaRPr lang="en-US"/>
           </a:p>
@@ -7810,7 +7810,7 @@
               <a:pPr>
                 <a:defRPr/>
               </a:pPr>
-              <a:t>9/30/2018</a:t>
+              <a:t>10/1/2018</a:t>
             </a:fld>
             <a:endParaRPr lang="en-US"/>
           </a:p>
@@ -8073,7 +8073,7 @@
               <a:pPr>
                 <a:defRPr/>
               </a:pPr>
-              <a:t>9/30/2018</a:t>
+              <a:t>10/1/2018</a:t>
             </a:fld>
             <a:endParaRPr lang="en-US"/>
           </a:p>
@@ -8378,7 +8378,7 @@
               <a:pPr>
                 <a:defRPr/>
               </a:pPr>
-              <a:t>9/30/2018</a:t>
+              <a:t>10/1/2018</a:t>
             </a:fld>
             <a:endParaRPr lang="en-US"/>
           </a:p>
@@ -8817,7 +8817,7 @@
               <a:pPr>
                 <a:defRPr/>
               </a:pPr>
-              <a:t>9/30/2018</a:t>
+              <a:t>10/1/2018</a:t>
             </a:fld>
             <a:endParaRPr lang="en-US"/>
           </a:p>
@@ -8952,7 +8952,7 @@
               <a:pPr>
                 <a:defRPr/>
               </a:pPr>
-              <a:t>9/30/2018</a:t>
+              <a:t>10/1/2018</a:t>
             </a:fld>
             <a:endParaRPr lang="en-US"/>
           </a:p>
@@ -9257,7 +9257,7 @@
               <a:pPr>
                 <a:defRPr/>
               </a:pPr>
-              <a:t>9/30/2018</a:t>
+              <a:t>10/1/2018</a:t>
             </a:fld>
             <a:endParaRPr lang="en-US"/>
           </a:p>
@@ -9369,7 +9369,7 @@
               <a:pPr>
                 <a:defRPr/>
               </a:pPr>
-              <a:t>9/30/2018</a:t>
+              <a:t>10/1/2018</a:t>
             </a:fld>
             <a:endParaRPr lang="en-US"/>
           </a:p>
@@ -9663,7 +9663,7 @@
               <a:pPr>
                 <a:defRPr/>
               </a:pPr>
-              <a:t>9/30/2018</a:t>
+              <a:t>10/1/2018</a:t>
             </a:fld>
             <a:endParaRPr lang="en-US"/>
           </a:p>
@@ -9940,7 +9940,7 @@
               <a:pPr>
                 <a:defRPr/>
               </a:pPr>
-              <a:t>9/30/2018</a:t>
+              <a:t>10/1/2018</a:t>
             </a:fld>
             <a:endParaRPr lang="en-US"/>
           </a:p>
@@ -10127,7 +10127,7 @@
               <a:pPr>
                 <a:defRPr/>
               </a:pPr>
-              <a:t>9/30/2018</a:t>
+              <a:t>10/1/2018</a:t>
             </a:fld>
             <a:endParaRPr lang="en-US"/>
           </a:p>
@@ -10324,7 +10324,7 @@
               <a:pPr>
                 <a:defRPr/>
               </a:pPr>
-              <a:t>9/30/2018</a:t>
+              <a:t>10/1/2018</a:t>
             </a:fld>
             <a:endParaRPr lang="en-US"/>
           </a:p>
@@ -10583,7 +10583,7 @@
               <a:pPr>
                 <a:defRPr/>
               </a:pPr>
-              <a:t>9/30/2018</a:t>
+              <a:t>10/1/2018</a:t>
             </a:fld>
             <a:endParaRPr lang="en-US"/>
           </a:p>
@@ -10770,7 +10770,7 @@
               <a:pPr>
                 <a:defRPr/>
               </a:pPr>
-              <a:t>9/30/2018</a:t>
+              <a:t>10/1/2018</a:t>
             </a:fld>
             <a:endParaRPr lang="en-US"/>
           </a:p>
@@ -11033,7 +11033,7 @@
               <a:pPr>
                 <a:defRPr/>
               </a:pPr>
-              <a:t>9/30/2018</a:t>
+              <a:t>10/1/2018</a:t>
             </a:fld>
             <a:endParaRPr lang="en-US"/>
           </a:p>
@@ -11338,7 +11338,7 @@
               <a:pPr>
                 <a:defRPr/>
               </a:pPr>
-              <a:t>9/30/2018</a:t>
+              <a:t>10/1/2018</a:t>
             </a:fld>
             <a:endParaRPr lang="en-US"/>
           </a:p>
@@ -11777,7 +11777,7 @@
               <a:pPr>
                 <a:defRPr/>
               </a:pPr>
-              <a:t>9/30/2018</a:t>
+              <a:t>10/1/2018</a:t>
             </a:fld>
             <a:endParaRPr lang="en-US"/>
           </a:p>
@@ -12216,7 +12216,7 @@
               <a:pPr>
                 <a:defRPr/>
               </a:pPr>
-              <a:t>9/30/2018</a:t>
+              <a:t>10/1/2018</a:t>
             </a:fld>
             <a:endParaRPr lang="en-US"/>
           </a:p>
@@ -12351,7 +12351,7 @@
               <a:pPr>
                 <a:defRPr/>
               </a:pPr>
-              <a:t>9/30/2018</a:t>
+              <a:t>10/1/2018</a:t>
             </a:fld>
             <a:endParaRPr lang="en-US"/>
           </a:p>
@@ -12463,7 +12463,7 @@
               <a:pPr>
                 <a:defRPr/>
               </a:pPr>
-              <a:t>9/30/2018</a:t>
+              <a:t>10/1/2018</a:t>
             </a:fld>
             <a:endParaRPr lang="en-US"/>
           </a:p>
@@ -12757,7 +12757,7 @@
               <a:pPr>
                 <a:defRPr/>
               </a:pPr>
-              <a:t>9/30/2018</a:t>
+              <a:t>10/1/2018</a:t>
             </a:fld>
             <a:endParaRPr lang="en-US"/>
           </a:p>
@@ -13034,7 +13034,7 @@
               <a:pPr>
                 <a:defRPr/>
               </a:pPr>
-              <a:t>9/30/2018</a:t>
+              <a:t>10/1/2018</a:t>
             </a:fld>
             <a:endParaRPr lang="en-US"/>
           </a:p>
@@ -13221,7 +13221,7 @@
               <a:pPr>
                 <a:defRPr/>
               </a:pPr>
-              <a:t>9/30/2018</a:t>
+              <a:t>10/1/2018</a:t>
             </a:fld>
             <a:endParaRPr lang="en-US"/>
           </a:p>
@@ -13418,7 +13418,7 @@
               <a:pPr>
                 <a:defRPr/>
               </a:pPr>
-              <a:t>9/30/2018</a:t>
+              <a:t>10/1/2018</a:t>
             </a:fld>
             <a:endParaRPr lang="en-US"/>
           </a:p>
@@ -13677,7 +13677,7 @@
               <a:pPr>
                 <a:defRPr/>
               </a:pPr>
-              <a:t>9/30/2018</a:t>
+              <a:t>10/1/2018</a:t>
             </a:fld>
             <a:endParaRPr lang="en-US"/>
           </a:p>
@@ -13864,7 +13864,7 @@
               <a:pPr>
                 <a:defRPr/>
               </a:pPr>
-              <a:t>9/30/2018</a:t>
+              <a:t>10/1/2018</a:t>
             </a:fld>
             <a:endParaRPr lang="en-US"/>
           </a:p>
@@ -14127,7 +14127,7 @@
               <a:pPr>
                 <a:defRPr/>
               </a:pPr>
-              <a:t>9/30/2018</a:t>
+              <a:t>10/1/2018</a:t>
             </a:fld>
             <a:endParaRPr lang="en-US"/>
           </a:p>
@@ -14432,7 +14432,7 @@
               <a:pPr>
                 <a:defRPr/>
               </a:pPr>
-              <a:t>9/30/2018</a:t>
+              <a:t>10/1/2018</a:t>
             </a:fld>
             <a:endParaRPr lang="en-US"/>
           </a:p>
@@ -14567,7 +14567,7 @@
               <a:pPr>
                 <a:defRPr/>
               </a:pPr>
-              <a:t>9/30/2018</a:t>
+              <a:t>10/1/2018</a:t>
             </a:fld>
             <a:endParaRPr lang="en-US"/>
           </a:p>
@@ -15006,7 +15006,7 @@
               <a:pPr>
                 <a:defRPr/>
               </a:pPr>
-              <a:t>9/30/2018</a:t>
+              <a:t>10/1/2018</a:t>
             </a:fld>
             <a:endParaRPr lang="en-US"/>
           </a:p>
@@ -15141,7 +15141,7 @@
               <a:pPr>
                 <a:defRPr/>
               </a:pPr>
-              <a:t>9/30/2018</a:t>
+              <a:t>10/1/2018</a:t>
             </a:fld>
             <a:endParaRPr lang="en-US"/>
           </a:p>
@@ -15253,7 +15253,7 @@
               <a:pPr>
                 <a:defRPr/>
               </a:pPr>
-              <a:t>9/30/2018</a:t>
+              <a:t>10/1/2018</a:t>
             </a:fld>
             <a:endParaRPr lang="en-US"/>
           </a:p>
@@ -15547,7 +15547,7 @@
               <a:pPr>
                 <a:defRPr/>
               </a:pPr>
-              <a:t>9/30/2018</a:t>
+              <a:t>10/1/2018</a:t>
             </a:fld>
             <a:endParaRPr lang="en-US"/>
           </a:p>
@@ -15824,7 +15824,7 @@
               <a:pPr>
                 <a:defRPr/>
               </a:pPr>
-              <a:t>9/30/2018</a:t>
+              <a:t>10/1/2018</a:t>
             </a:fld>
             <a:endParaRPr lang="en-US"/>
           </a:p>
@@ -16011,7 +16011,7 @@
               <a:pPr>
                 <a:defRPr/>
               </a:pPr>
-              <a:t>9/30/2018</a:t>
+              <a:t>10/1/2018</a:t>
             </a:fld>
             <a:endParaRPr lang="en-US"/>
           </a:p>
@@ -16208,7 +16208,7 @@
               <a:pPr>
                 <a:defRPr/>
               </a:pPr>
-              <a:t>9/30/2018</a:t>
+              <a:t>10/1/2018</a:t>
             </a:fld>
             <a:endParaRPr lang="en-US"/>
           </a:p>
@@ -16467,7 +16467,7 @@
               <a:pPr>
                 <a:defRPr/>
               </a:pPr>
-              <a:t>9/30/2018</a:t>
+              <a:t>10/1/2018</a:t>
             </a:fld>
             <a:endParaRPr lang="en-US"/>
           </a:p>
@@ -16654,7 +16654,7 @@
               <a:pPr>
                 <a:defRPr/>
               </a:pPr>
-              <a:t>9/30/2018</a:t>
+              <a:t>10/1/2018</a:t>
             </a:fld>
             <a:endParaRPr lang="en-US"/>
           </a:p>
@@ -16917,7 +16917,7 @@
               <a:pPr>
                 <a:defRPr/>
               </a:pPr>
-              <a:t>9/30/2018</a:t>
+              <a:t>10/1/2018</a:t>
             </a:fld>
             <a:endParaRPr lang="en-US"/>
           </a:p>
@@ -17029,7 +17029,7 @@
               <a:pPr>
                 <a:defRPr/>
               </a:pPr>
-              <a:t>9/30/2018</a:t>
+              <a:t>10/1/2018</a:t>
             </a:fld>
             <a:endParaRPr lang="en-US"/>
           </a:p>
@@ -17334,7 +17334,7 @@
               <a:pPr>
                 <a:defRPr/>
               </a:pPr>
-              <a:t>9/30/2018</a:t>
+              <a:t>10/1/2018</a:t>
             </a:fld>
             <a:endParaRPr lang="en-US"/>
           </a:p>
@@ -17773,7 +17773,7 @@
               <a:pPr>
                 <a:defRPr/>
               </a:pPr>
-              <a:t>9/30/2018</a:t>
+              <a:t>10/1/2018</a:t>
             </a:fld>
             <a:endParaRPr lang="en-US"/>
           </a:p>
@@ -17908,7 +17908,7 @@
               <a:pPr>
                 <a:defRPr/>
               </a:pPr>
-              <a:t>9/30/2018</a:t>
+              <a:t>10/1/2018</a:t>
             </a:fld>
             <a:endParaRPr lang="en-US"/>
           </a:p>
@@ -18020,7 +18020,7 @@
               <a:pPr>
                 <a:defRPr/>
               </a:pPr>
-              <a:t>9/30/2018</a:t>
+              <a:t>10/1/2018</a:t>
             </a:fld>
             <a:endParaRPr lang="en-US"/>
           </a:p>
@@ -18314,7 +18314,7 @@
               <a:pPr>
                 <a:defRPr/>
               </a:pPr>
-              <a:t>9/30/2018</a:t>
+              <a:t>10/1/2018</a:t>
             </a:fld>
             <a:endParaRPr lang="en-US"/>
           </a:p>
@@ -18591,7 +18591,7 @@
               <a:pPr>
                 <a:defRPr/>
               </a:pPr>
-              <a:t>9/30/2018</a:t>
+              <a:t>10/1/2018</a:t>
             </a:fld>
             <a:endParaRPr lang="en-US"/>
           </a:p>
@@ -18778,7 +18778,7 @@
               <a:pPr>
                 <a:defRPr/>
               </a:pPr>
-              <a:t>9/30/2018</a:t>
+              <a:t>10/1/2018</a:t>
             </a:fld>
             <a:endParaRPr lang="en-US"/>
           </a:p>
@@ -18975,7 +18975,7 @@
               <a:pPr>
                 <a:defRPr/>
               </a:pPr>
-              <a:t>9/30/2018</a:t>
+              <a:t>10/1/2018</a:t>
             </a:fld>
             <a:endParaRPr lang="en-US"/>
           </a:p>
@@ -19234,7 +19234,7 @@
               <a:pPr>
                 <a:defRPr/>
               </a:pPr>
-              <a:t>9/30/2018</a:t>
+              <a:t>10/1/2018</a:t>
             </a:fld>
             <a:endParaRPr lang="en-US"/>
           </a:p>
@@ -19421,7 +19421,7 @@
               <a:pPr>
                 <a:defRPr/>
               </a:pPr>
-              <a:t>9/30/2018</a:t>
+              <a:t>10/1/2018</a:t>
             </a:fld>
             <a:endParaRPr lang="en-US"/>
           </a:p>
@@ -19715,7 +19715,7 @@
               <a:pPr>
                 <a:defRPr/>
               </a:pPr>
-              <a:t>9/30/2018</a:t>
+              <a:t>10/1/2018</a:t>
             </a:fld>
             <a:endParaRPr lang="en-US"/>
           </a:p>
@@ -19978,7 +19978,7 @@
               <a:pPr>
                 <a:defRPr/>
               </a:pPr>
-              <a:t>9/30/2018</a:t>
+              <a:t>10/1/2018</a:t>
             </a:fld>
             <a:endParaRPr lang="en-US"/>
           </a:p>
@@ -20283,7 +20283,7 @@
               <a:pPr>
                 <a:defRPr/>
               </a:pPr>
-              <a:t>9/30/2018</a:t>
+              <a:t>10/1/2018</a:t>
             </a:fld>
             <a:endParaRPr lang="en-US"/>
           </a:p>
@@ -20722,7 +20722,7 @@
               <a:pPr>
                 <a:defRPr/>
               </a:pPr>
-              <a:t>9/30/2018</a:t>
+              <a:t>10/1/2018</a:t>
             </a:fld>
             <a:endParaRPr lang="en-US"/>
           </a:p>
@@ -20857,7 +20857,7 @@
               <a:pPr>
                 <a:defRPr/>
               </a:pPr>
-              <a:t>9/30/2018</a:t>
+              <a:t>10/1/2018</a:t>
             </a:fld>
             <a:endParaRPr lang="en-US"/>
           </a:p>
@@ -20969,7 +20969,7 @@
               <a:pPr>
                 <a:defRPr/>
               </a:pPr>
-              <a:t>9/30/2018</a:t>
+              <a:t>10/1/2018</a:t>
             </a:fld>
             <a:endParaRPr lang="en-US"/>
           </a:p>
@@ -21263,7 +21263,7 @@
               <a:pPr>
                 <a:defRPr/>
               </a:pPr>
-              <a:t>9/30/2018</a:t>
+              <a:t>10/1/2018</a:t>
             </a:fld>
             <a:endParaRPr lang="en-US"/>
           </a:p>
@@ -21540,7 +21540,7 @@
               <a:pPr>
                 <a:defRPr/>
               </a:pPr>
-              <a:t>9/30/2018</a:t>
+              <a:t>10/1/2018</a:t>
             </a:fld>
             <a:endParaRPr lang="en-US"/>
           </a:p>
@@ -21727,7 +21727,7 @@
               <a:pPr>
                 <a:defRPr/>
               </a:pPr>
-              <a:t>9/30/2018</a:t>
+              <a:t>10/1/2018</a:t>
             </a:fld>
             <a:endParaRPr lang="en-US"/>
           </a:p>
@@ -21924,7 +21924,7 @@
               <a:pPr>
                 <a:defRPr/>
               </a:pPr>
-              <a:t>9/30/2018</a:t>
+              <a:t>10/1/2018</a:t>
             </a:fld>
             <a:endParaRPr lang="en-US"/>
           </a:p>
@@ -22201,7 +22201,7 @@
               <a:pPr>
                 <a:defRPr/>
               </a:pPr>
-              <a:t>9/30/2018</a:t>
+              <a:t>10/1/2018</a:t>
             </a:fld>
             <a:endParaRPr lang="en-US"/>
           </a:p>
@@ -22456,7 +22456,7 @@
               <a:pPr>
                 <a:defRPr/>
               </a:pPr>
-              <a:t>9/30/2018</a:t>
+              <a:t>10/1/2018</a:t>
             </a:fld>
             <a:endParaRPr lang="en-US"/>
           </a:p>
@@ -23139,7 +23139,7 @@
               <a:pPr>
                 <a:defRPr/>
               </a:pPr>
-              <a:t>9/30/2018</a:t>
+              <a:t>10/1/2018</a:t>
             </a:fld>
             <a:endParaRPr lang="en-US"/>
           </a:p>
@@ -23822,7 +23822,7 @@
               <a:pPr>
                 <a:defRPr/>
               </a:pPr>
-              <a:t>9/30/2018</a:t>
+              <a:t>10/1/2018</a:t>
             </a:fld>
             <a:endParaRPr lang="en-US"/>
           </a:p>
@@ -24505,7 +24505,7 @@
               <a:pPr>
                 <a:defRPr/>
               </a:pPr>
-              <a:t>9/30/2018</a:t>
+              <a:t>10/1/2018</a:t>
             </a:fld>
             <a:endParaRPr lang="en-US"/>
           </a:p>
@@ -25188,7 +25188,7 @@
               <a:pPr>
                 <a:defRPr/>
               </a:pPr>
-              <a:t>9/30/2018</a:t>
+              <a:t>10/1/2018</a:t>
             </a:fld>
             <a:endParaRPr lang="en-US"/>
           </a:p>
@@ -25871,7 +25871,7 @@
               <a:pPr>
                 <a:defRPr/>
               </a:pPr>
-              <a:t>9/30/2018</a:t>
+              <a:t>10/1/2018</a:t>
             </a:fld>
             <a:endParaRPr lang="en-US"/>
           </a:p>
@@ -26554,7 +26554,7 @@
               <a:pPr>
                 <a:defRPr/>
               </a:pPr>
-              <a:t>9/30/2018</a:t>
+              <a:t>10/1/2018</a:t>
             </a:fld>
             <a:endParaRPr lang="en-US"/>
           </a:p>
@@ -27237,7 +27237,7 @@
               <a:pPr>
                 <a:defRPr/>
               </a:pPr>
-              <a:t>9/30/2018</a:t>
+              <a:t>10/1/2018</a:t>
             </a:fld>
             <a:endParaRPr lang="en-US"/>
           </a:p>
@@ -27781,7 +27781,7 @@
           <p:cNvPr id="7" name="Imagem 6">
             <a:extLst>
               <a:ext uri="{FF2B5EF4-FFF2-40B4-BE49-F238E27FC236}">
-                <a16:creationId xmlns:a16="http://schemas.microsoft.com/office/drawing/2014/main" xmlns="" id="{E8B7DEF8-F274-4FB1-961E-BE37BD79FEA6}"/>
+                <a16:creationId xmlns="" xmlns:a16="http://schemas.microsoft.com/office/drawing/2014/main" id="{E8B7DEF8-F274-4FB1-961E-BE37BD79FEA6}"/>
               </a:ext>
             </a:extLst>
           </p:cNvPr>
@@ -27817,7 +27817,7 @@
           <a:blip r:embed="rId5">
             <a:extLst>
               <a:ext uri="{28A0092B-C50C-407E-A947-70E740481C1C}">
-                <a14:useLocalDpi xmlns:a14="http://schemas.microsoft.com/office/drawing/2010/main" val="0"/>
+                <a14:useLocalDpi xmlns:a14="http://schemas.microsoft.com/office/drawing/2010/main" xmlns="" val="0"/>
               </a:ext>
             </a:extLst>
           </a:blip>
@@ -27937,7 +27937,7 @@
           <p:cNvPr id="7" name="Imagem 6">
             <a:extLst>
               <a:ext uri="{FF2B5EF4-FFF2-40B4-BE49-F238E27FC236}">
-                <a16:creationId xmlns:a16="http://schemas.microsoft.com/office/drawing/2014/main" xmlns="" id="{E8B7DEF8-F274-4FB1-961E-BE37BD79FEA6}"/>
+                <a16:creationId xmlns="" xmlns:a16="http://schemas.microsoft.com/office/drawing/2014/main" id="{E8B7DEF8-F274-4FB1-961E-BE37BD79FEA6}"/>
               </a:ext>
             </a:extLst>
           </p:cNvPr>
@@ -28059,7 +28059,7 @@
     </p:spTree>
     <p:extLst>
       <p:ext uri="{BB962C8B-B14F-4D97-AF65-F5344CB8AC3E}">
-        <p14:creationId xmlns:p14="http://schemas.microsoft.com/office/powerpoint/2010/main" val="2980370885"/>
+        <p14:creationId xmlns:p14="http://schemas.microsoft.com/office/powerpoint/2010/main" xmlns="" val="2980370885"/>
       </p:ext>
     </p:extLst>
   </p:cSld>
@@ -28124,7 +28124,7 @@
           <p:cNvPr id="7" name="Imagem 6">
             <a:extLst>
               <a:ext uri="{FF2B5EF4-FFF2-40B4-BE49-F238E27FC236}">
-                <a16:creationId xmlns:a16="http://schemas.microsoft.com/office/drawing/2014/main" xmlns="" id="{E8B7DEF8-F274-4FB1-961E-BE37BD79FEA6}"/>
+                <a16:creationId xmlns="" xmlns:a16="http://schemas.microsoft.com/office/drawing/2014/main" id="{E8B7DEF8-F274-4FB1-961E-BE37BD79FEA6}"/>
               </a:ext>
             </a:extLst>
           </p:cNvPr>
@@ -28262,7 +28262,7 @@
     </p:spTree>
     <p:extLst>
       <p:ext uri="{BB962C8B-B14F-4D97-AF65-F5344CB8AC3E}">
-        <p14:creationId xmlns:p14="http://schemas.microsoft.com/office/powerpoint/2010/main" val="1904919384"/>
+        <p14:creationId xmlns:p14="http://schemas.microsoft.com/office/powerpoint/2010/main" xmlns="" val="1904919384"/>
       </p:ext>
     </p:extLst>
   </p:cSld>
@@ -28327,7 +28327,7 @@
           <p:cNvPr id="7" name="Imagem 6">
             <a:extLst>
               <a:ext uri="{FF2B5EF4-FFF2-40B4-BE49-F238E27FC236}">
-                <a16:creationId xmlns:a16="http://schemas.microsoft.com/office/drawing/2014/main" xmlns="" id="{E8B7DEF8-F274-4FB1-961E-BE37BD79FEA6}"/>
+                <a16:creationId xmlns="" xmlns:a16="http://schemas.microsoft.com/office/drawing/2014/main" id="{E8B7DEF8-F274-4FB1-961E-BE37BD79FEA6}"/>
               </a:ext>
             </a:extLst>
           </p:cNvPr>
@@ -28657,7 +28657,7 @@
     </p:spTree>
     <p:extLst>
       <p:ext uri="{BB962C8B-B14F-4D97-AF65-F5344CB8AC3E}">
-        <p14:creationId xmlns:p14="http://schemas.microsoft.com/office/powerpoint/2010/main" val="2943395286"/>
+        <p14:creationId xmlns:p14="http://schemas.microsoft.com/office/powerpoint/2010/main" xmlns="" val="2943395286"/>
       </p:ext>
     </p:extLst>
   </p:cSld>
@@ -28722,7 +28722,7 @@
           <p:cNvPr id="7" name="Imagem 6">
             <a:extLst>
               <a:ext uri="{FF2B5EF4-FFF2-40B4-BE49-F238E27FC236}">
-                <a16:creationId xmlns:a16="http://schemas.microsoft.com/office/drawing/2014/main" xmlns="" id="{E8B7DEF8-F274-4FB1-961E-BE37BD79FEA6}"/>
+                <a16:creationId xmlns="" xmlns:a16="http://schemas.microsoft.com/office/drawing/2014/main" id="{E8B7DEF8-F274-4FB1-961E-BE37BD79FEA6}"/>
               </a:ext>
             </a:extLst>
           </p:cNvPr>
@@ -28950,7 +28950,7 @@
     </p:spTree>
     <p:extLst>
       <p:ext uri="{BB962C8B-B14F-4D97-AF65-F5344CB8AC3E}">
-        <p14:creationId xmlns:p14="http://schemas.microsoft.com/office/powerpoint/2010/main" val="3623294253"/>
+        <p14:creationId xmlns:p14="http://schemas.microsoft.com/office/powerpoint/2010/main" xmlns="" val="3623294253"/>
       </p:ext>
     </p:extLst>
   </p:cSld>
@@ -29015,7 +29015,7 @@
           <p:cNvPr id="7" name="Imagem 6">
             <a:extLst>
               <a:ext uri="{FF2B5EF4-FFF2-40B4-BE49-F238E27FC236}">
-                <a16:creationId xmlns:a16="http://schemas.microsoft.com/office/drawing/2014/main" xmlns="" id="{E8B7DEF8-F274-4FB1-961E-BE37BD79FEA6}"/>
+                <a16:creationId xmlns="" xmlns:a16="http://schemas.microsoft.com/office/drawing/2014/main" id="{E8B7DEF8-F274-4FB1-961E-BE37BD79FEA6}"/>
               </a:ext>
             </a:extLst>
           </p:cNvPr>
@@ -29121,7 +29121,7 @@
         <p:spPr>
           <a:xfrm>
             <a:off x="59943" y="1455515"/>
-            <a:ext cx="9048467" cy="5863144"/>
+            <a:ext cx="9048467" cy="5093702"/>
           </a:xfrm>
           <a:prstGeom prst="rect">
             <a:avLst/>
@@ -29291,12 +29291,6 @@
               </a:rPr>
               <a:t>balramchavan/using-async-await-feature-in-angular-587dd56fdc77</a:t>
             </a:r>
-            <a:endParaRPr lang="pt-BR" dirty="0" smtClean="0"/>
-          </a:p>
-          <a:p>
-            <a:endParaRPr lang="pt-BR" dirty="0" smtClean="0"/>
-          </a:p>
-          <a:p>
             <a:endParaRPr lang="pt-BR" dirty="0"/>
           </a:p>
         </p:txBody>
@@ -29304,7 +29298,7 @@
     </p:spTree>
     <p:extLst>
       <p:ext uri="{BB962C8B-B14F-4D97-AF65-F5344CB8AC3E}">
-        <p14:creationId xmlns:p14="http://schemas.microsoft.com/office/powerpoint/2010/main" val="4136118521"/>
+        <p14:creationId xmlns:p14="http://schemas.microsoft.com/office/powerpoint/2010/main" xmlns="" val="4136118521"/>
       </p:ext>
     </p:extLst>
   </p:cSld>
@@ -32136,7 +32130,7 @@
   <a:extraClrSchemeLst/>
   <a:extLst>
     <a:ext uri="{05A4C25C-085E-4340-85A3-A5531E510DB2}">
-      <thm15:themeFamily xmlns:thm15="http://schemas.microsoft.com/office/thememl/2012/main" name="Office Theme" id="{62F939B6-93AF-4DB8-9C6B-D6C7DFDC589F}" vid="{4A3C46E8-61CC-4603-A589-7422A47A8E4A}"/>
+      <thm15:themeFamily xmlns:thm15="http://schemas.microsoft.com/office/thememl/2012/main" xmlns="" name="Office Theme" id="{62F939B6-93AF-4DB8-9C6B-D6C7DFDC589F}" vid="{4A3C46E8-61CC-4603-A589-7422A47A8E4A}"/>
     </a:ext>
   </a:extLst>
 </a:theme>

</xml_diff>